<commit_message>
Fixed Squad QA issues and resolved RAGAS dependency issues.
</commit_message>
<xml_diff>
--- a/docs/docker_architecture.pptx
+++ b/docs/docker_architecture.pptx
@@ -104,6 +104,11 @@
       </a:defRPr>
     </a:lvl9pPr>
   </p:defaultTextStyle>
+  <p:extLst>
+    <p:ext uri="{EFAFB233-063F-42B5-8137-9DF3F51BA10A}">
+      <p15:sldGuideLst xmlns:p15="http://schemas.microsoft.com/office/powerpoint/2012/main"/>
+    </p:ext>
+  </p:extLst>
 </p:presentation>
 </file>
 
@@ -254,7 +259,7 @@
           <a:p>
             <a:fld id="{06B4EBA1-9081-49B6-86D2-9886AC28DFB5}" type="datetimeFigureOut">
               <a:rPr lang="en-US" smtClean="0"/>
-              <a:t>9/17/2024</a:t>
+              <a:t>9/18/2024</a:t>
             </a:fld>
             <a:endParaRPr lang="en-US"/>
           </a:p>
@@ -452,7 +457,7 @@
           <a:p>
             <a:fld id="{06B4EBA1-9081-49B6-86D2-9886AC28DFB5}" type="datetimeFigureOut">
               <a:rPr lang="en-US" smtClean="0"/>
-              <a:t>9/17/2024</a:t>
+              <a:t>9/18/2024</a:t>
             </a:fld>
             <a:endParaRPr lang="en-US"/>
           </a:p>
@@ -660,7 +665,7 @@
           <a:p>
             <a:fld id="{06B4EBA1-9081-49B6-86D2-9886AC28DFB5}" type="datetimeFigureOut">
               <a:rPr lang="en-US" smtClean="0"/>
-              <a:t>9/17/2024</a:t>
+              <a:t>9/18/2024</a:t>
             </a:fld>
             <a:endParaRPr lang="en-US"/>
           </a:p>
@@ -858,7 +863,7 @@
           <a:p>
             <a:fld id="{06B4EBA1-9081-49B6-86D2-9886AC28DFB5}" type="datetimeFigureOut">
               <a:rPr lang="en-US" smtClean="0"/>
-              <a:t>9/17/2024</a:t>
+              <a:t>9/18/2024</a:t>
             </a:fld>
             <a:endParaRPr lang="en-US"/>
           </a:p>
@@ -1133,7 +1138,7 @@
           <a:p>
             <a:fld id="{06B4EBA1-9081-49B6-86D2-9886AC28DFB5}" type="datetimeFigureOut">
               <a:rPr lang="en-US" smtClean="0"/>
-              <a:t>9/17/2024</a:t>
+              <a:t>9/18/2024</a:t>
             </a:fld>
             <a:endParaRPr lang="en-US"/>
           </a:p>
@@ -1398,7 +1403,7 @@
           <a:p>
             <a:fld id="{06B4EBA1-9081-49B6-86D2-9886AC28DFB5}" type="datetimeFigureOut">
               <a:rPr lang="en-US" smtClean="0"/>
-              <a:t>9/17/2024</a:t>
+              <a:t>9/18/2024</a:t>
             </a:fld>
             <a:endParaRPr lang="en-US"/>
           </a:p>
@@ -1810,7 +1815,7 @@
           <a:p>
             <a:fld id="{06B4EBA1-9081-49B6-86D2-9886AC28DFB5}" type="datetimeFigureOut">
               <a:rPr lang="en-US" smtClean="0"/>
-              <a:t>9/17/2024</a:t>
+              <a:t>9/18/2024</a:t>
             </a:fld>
             <a:endParaRPr lang="en-US"/>
           </a:p>
@@ -1951,7 +1956,7 @@
           <a:p>
             <a:fld id="{06B4EBA1-9081-49B6-86D2-9886AC28DFB5}" type="datetimeFigureOut">
               <a:rPr lang="en-US" smtClean="0"/>
-              <a:t>9/17/2024</a:t>
+              <a:t>9/18/2024</a:t>
             </a:fld>
             <a:endParaRPr lang="en-US"/>
           </a:p>
@@ -2064,7 +2069,7 @@
           <a:p>
             <a:fld id="{06B4EBA1-9081-49B6-86D2-9886AC28DFB5}" type="datetimeFigureOut">
               <a:rPr lang="en-US" smtClean="0"/>
-              <a:t>9/17/2024</a:t>
+              <a:t>9/18/2024</a:t>
             </a:fld>
             <a:endParaRPr lang="en-US"/>
           </a:p>
@@ -2375,7 +2380,7 @@
           <a:p>
             <a:fld id="{06B4EBA1-9081-49B6-86D2-9886AC28DFB5}" type="datetimeFigureOut">
               <a:rPr lang="en-US" smtClean="0"/>
-              <a:t>9/17/2024</a:t>
+              <a:t>9/18/2024</a:t>
             </a:fld>
             <a:endParaRPr lang="en-US"/>
           </a:p>
@@ -2663,7 +2668,7 @@
           <a:p>
             <a:fld id="{06B4EBA1-9081-49B6-86D2-9886AC28DFB5}" type="datetimeFigureOut">
               <a:rPr lang="en-US" smtClean="0"/>
-              <a:t>9/17/2024</a:t>
+              <a:t>9/18/2024</a:t>
             </a:fld>
             <a:endParaRPr lang="en-US"/>
           </a:p>
@@ -2904,7 +2909,7 @@
           <a:p>
             <a:fld id="{06B4EBA1-9081-49B6-86D2-9886AC28DFB5}" type="datetimeFigureOut">
               <a:rPr lang="en-US" smtClean="0"/>
-              <a:t>9/17/2024</a:t>
+              <a:t>9/18/2024</a:t>
             </a:fld>
             <a:endParaRPr lang="en-US"/>
           </a:p>
@@ -5124,6 +5129,162 @@
             </a:solidFill>
             <a:tailEnd type="triangle"/>
           </a:ln>
+        </p:spPr>
+        <p:style>
+          <a:lnRef idx="1">
+            <a:schemeClr val="accent1"/>
+          </a:lnRef>
+          <a:fillRef idx="0">
+            <a:schemeClr val="accent1"/>
+          </a:fillRef>
+          <a:effectRef idx="0">
+            <a:schemeClr val="accent1"/>
+          </a:effectRef>
+          <a:fontRef idx="minor">
+            <a:schemeClr val="tx1"/>
+          </a:fontRef>
+        </p:style>
+      </p:cxnSp>
+      <p:pic>
+        <p:nvPicPr>
+          <p:cNvPr id="3" name="Graphic 2" descr="Cloud Computing with solid fill">
+            <a:extLst>
+              <a:ext uri="{FF2B5EF4-FFF2-40B4-BE49-F238E27FC236}">
+                <a16:creationId xmlns:a16="http://schemas.microsoft.com/office/drawing/2014/main" id="{12044646-0F5C-D4ED-2B43-222708D5EA43}"/>
+              </a:ext>
+            </a:extLst>
+          </p:cNvPr>
+          <p:cNvPicPr>
+            <a:picLocks noChangeAspect="1"/>
+          </p:cNvPicPr>
+          <p:nvPr/>
+        </p:nvPicPr>
+        <p:blipFill>
+          <a:blip r:embed="rId9">
+            <a:extLst>
+              <a:ext uri="{28A0092B-C50C-407E-A947-70E740481C1C}">
+                <a14:useLocalDpi xmlns:a14="http://schemas.microsoft.com/office/drawing/2010/main" val="0"/>
+              </a:ext>
+              <a:ext uri="{96DAC541-7B7A-43D3-8B79-37D633B846F1}">
+                <asvg:svgBlip xmlns:asvg="http://schemas.microsoft.com/office/drawing/2016/SVG/main" r:embed="rId10"/>
+              </a:ext>
+            </a:extLst>
+          </a:blip>
+          <a:stretch>
+            <a:fillRect/>
+          </a:stretch>
+        </p:blipFill>
+        <p:spPr>
+          <a:xfrm>
+            <a:off x="8355619" y="1665793"/>
+            <a:ext cx="489192" cy="489192"/>
+          </a:xfrm>
+          <a:prstGeom prst="rect">
+            <a:avLst/>
+          </a:prstGeom>
+        </p:spPr>
+      </p:pic>
+      <p:sp>
+        <p:nvSpPr>
+          <p:cNvPr id="19" name="TextBox 18">
+            <a:extLst>
+              <a:ext uri="{FF2B5EF4-FFF2-40B4-BE49-F238E27FC236}">
+                <a16:creationId xmlns:a16="http://schemas.microsoft.com/office/drawing/2014/main" id="{AC143D57-5377-DA92-AC37-6B77FB65CA74}"/>
+              </a:ext>
+            </a:extLst>
+          </p:cNvPr>
+          <p:cNvSpPr txBox="1"/>
+          <p:nvPr/>
+        </p:nvSpPr>
+        <p:spPr>
+          <a:xfrm>
+            <a:off x="8623490" y="1963064"/>
+            <a:ext cx="768159" cy="430887"/>
+          </a:xfrm>
+          <a:prstGeom prst="rect">
+            <a:avLst/>
+          </a:prstGeom>
+          <a:noFill/>
+        </p:spPr>
+        <p:txBody>
+          <a:bodyPr wrap="none" rtlCol="0">
+            <a:spAutoFit/>
+          </a:bodyPr>
+          <a:lstStyle/>
+          <a:p>
+            <a:pPr algn="ctr"/>
+            <a:r>
+              <a:rPr lang="en-US" sz="1050" dirty="0"/>
+              <a:t>document</a:t>
+            </a:r>
+          </a:p>
+          <a:p>
+            <a:pPr algn="ctr"/>
+            <a:r>
+              <a:rPr lang="en-US" sz="1050" dirty="0"/>
+              <a:t>corpus</a:t>
+            </a:r>
+          </a:p>
+        </p:txBody>
+      </p:sp>
+      <p:cxnSp>
+        <p:nvCxnSpPr>
+          <p:cNvPr id="24" name="Straight Connector 23">
+            <a:extLst>
+              <a:ext uri="{FF2B5EF4-FFF2-40B4-BE49-F238E27FC236}">
+                <a16:creationId xmlns:a16="http://schemas.microsoft.com/office/drawing/2014/main" id="{ED3000C6-3331-6C00-628A-2373103FA0DE}"/>
+              </a:ext>
+            </a:extLst>
+          </p:cNvPr>
+          <p:cNvCxnSpPr/>
+          <p:nvPr/>
+        </p:nvCxnSpPr>
+        <p:spPr>
+          <a:xfrm flipH="1">
+            <a:off x="8253046" y="2154985"/>
+            <a:ext cx="124558" cy="233182"/>
+          </a:xfrm>
+          <a:prstGeom prst="line">
+            <a:avLst/>
+          </a:prstGeom>
+        </p:spPr>
+        <p:style>
+          <a:lnRef idx="1">
+            <a:schemeClr val="accent1"/>
+          </a:lnRef>
+          <a:fillRef idx="0">
+            <a:schemeClr val="accent1"/>
+          </a:fillRef>
+          <a:effectRef idx="0">
+            <a:schemeClr val="accent1"/>
+          </a:effectRef>
+          <a:fontRef idx="minor">
+            <a:schemeClr val="tx1"/>
+          </a:fontRef>
+        </p:style>
+      </p:cxnSp>
+      <p:cxnSp>
+        <p:nvCxnSpPr>
+          <p:cNvPr id="29" name="Straight Connector 28">
+            <a:extLst>
+              <a:ext uri="{FF2B5EF4-FFF2-40B4-BE49-F238E27FC236}">
+                <a16:creationId xmlns:a16="http://schemas.microsoft.com/office/drawing/2014/main" id="{B7A2C053-9AF0-08A1-2140-3BB448141359}"/>
+              </a:ext>
+            </a:extLst>
+          </p:cNvPr>
+          <p:cNvCxnSpPr>
+            <a:cxnSpLocks/>
+          </p:cNvCxnSpPr>
+          <p:nvPr/>
+        </p:nvCxnSpPr>
+        <p:spPr>
+          <a:xfrm flipH="1" flipV="1">
+            <a:off x="9374382" y="2191547"/>
+            <a:ext cx="153522" cy="192389"/>
+          </a:xfrm>
+          <a:prstGeom prst="line">
+            <a:avLst/>
+          </a:prstGeom>
         </p:spPr>
         <p:style>
           <a:lnRef idx="1">

</xml_diff>